<commit_message>
Tweaked session 10 slides.
</commit_message>
<xml_diff>
--- a/slides/session10.pptx
+++ b/slides/session10.pptx
@@ -8621,17 +8621,7 @@
                 <a:latin typeface="Gill Sans"/>
                 <a:cs typeface="Gill Sans"/>
               </a:rPr>
-              <a:t>Thursday, November </a:t>
-            </a:r>
-            <a:r>
-              <a:rPr lang="en-US" sz="2400" b="0" kern="0" dirty="0" smtClean="0">
-                <a:solidFill>
-                  <a:schemeClr val="bg1"/>
-                </a:solidFill>
-                <a:latin typeface="Gill Sans"/>
-                <a:cs typeface="Gill Sans"/>
-              </a:rPr>
-              <a:t>7</a:t>
+              <a:t>Thursday, November 7</a:t>
             </a:r>
             <a:r>
               <a:rPr lang="en-US" sz="2400" b="0" kern="0" smtClean="0">
@@ -33088,7 +33078,7 @@
           <a:graphicData uri="http://schemas.openxmlformats.org/presentationml/2006/ole">
             <mc:AlternateContent xmlns:mc="http://schemas.openxmlformats.org/markup-compatibility/2006">
               <mc:Choice xmlns:v="urn:schemas-microsoft-com:vml" Requires="v">
-                <p:oleObj spid="_x0000_s63681" name="Equation" r:id="rId4" imgW="1091880" imgH="431640" progId="Equation.3">
+                <p:oleObj spid="_x0000_s63698" name="Equation" r:id="rId4" imgW="1091880" imgH="431640" progId="Equation.3">
                   <p:embed/>
                 </p:oleObj>
               </mc:Choice>
@@ -33191,7 +33181,7 @@
           <a:graphicData uri="http://schemas.openxmlformats.org/presentationml/2006/ole">
             <mc:AlternateContent xmlns:mc="http://schemas.openxmlformats.org/markup-compatibility/2006">
               <mc:Choice xmlns:v="urn:schemas-microsoft-com:vml" Requires="v">
-                <p:oleObj spid="_x0000_s63682" name="Equation" r:id="rId6" imgW="291960" imgH="241200" progId="Equation.3">
+                <p:oleObj spid="_x0000_s63699" name="Equation" r:id="rId6" imgW="291960" imgH="241200" progId="Equation.3">
                   <p:embed/>
                 </p:oleObj>
               </mc:Choice>
@@ -33294,7 +33284,7 @@
           <a:graphicData uri="http://schemas.openxmlformats.org/presentationml/2006/ole">
             <mc:AlternateContent xmlns:mc="http://schemas.openxmlformats.org/markup-compatibility/2006">
               <mc:Choice xmlns:v="urn:schemas-microsoft-com:vml" Requires="v">
-                <p:oleObj spid="_x0000_s63683" name="Equation" r:id="rId8" imgW="253800" imgH="241200" progId="Equation.3">
+                <p:oleObj spid="_x0000_s63700" name="Equation" r:id="rId8" imgW="253800" imgH="241200" progId="Equation.3">
                   <p:embed/>
                 </p:oleObj>
               </mc:Choice>
@@ -33397,7 +33387,7 @@
           <a:graphicData uri="http://schemas.openxmlformats.org/presentationml/2006/ole">
             <mc:AlternateContent xmlns:mc="http://schemas.openxmlformats.org/markup-compatibility/2006">
               <mc:Choice xmlns:v="urn:schemas-microsoft-com:vml" Requires="v">
-                <p:oleObj spid="_x0000_s63684" name="Equation" r:id="rId10" imgW="177480" imgH="177480" progId="Equation.3">
+                <p:oleObj spid="_x0000_s63701" name="Equation" r:id="rId10" imgW="177480" imgH="177480" progId="Equation.3">
                   <p:embed/>
                 </p:oleObj>
               </mc:Choice>
@@ -33500,7 +33490,7 @@
           <a:graphicData uri="http://schemas.openxmlformats.org/presentationml/2006/ole">
             <mc:AlternateContent xmlns:mc="http://schemas.openxmlformats.org/markup-compatibility/2006">
               <mc:Choice xmlns:v="urn:schemas-microsoft-com:vml" Requires="v">
-                <p:oleObj spid="_x0000_s63685" name="Equation" r:id="rId12" imgW="152280" imgH="228600" progId="Equation.3">
+                <p:oleObj spid="_x0000_s63702" name="Equation" r:id="rId12" imgW="152280" imgH="228600" progId="Equation.3">
                   <p:embed/>
                 </p:oleObj>
               </mc:Choice>
@@ -47604,349 +47594,6 @@
                                           </p:stCondLst>
                                         </p:cTn>
                                         <p:tgtEl>
-                                          <p:spTgt spid="884739">
-                                            <p:txEl>
-                                              <p:pRg st="0" end="0"/>
-                                            </p:txEl>
-                                          </p:spTgt>
-                                        </p:tgtEl>
-                                        <p:attrNameLst>
-                                          <p:attrName>style.visibility</p:attrName>
-                                        </p:attrNameLst>
-                                      </p:cBhvr>
-                                      <p:to>
-                                        <p:strVal val="visible"/>
-                                      </p:to>
-                                    </p:set>
-                                  </p:childTnLst>
-                                </p:cTn>
-                              </p:par>
-                            </p:childTnLst>
-                          </p:cTn>
-                        </p:par>
-                      </p:childTnLst>
-                    </p:cTn>
-                  </p:par>
-                  <p:par>
-                    <p:cTn id="7" fill="hold" nodeType="clickPar">
-                      <p:stCondLst>
-                        <p:cond delay="indefinite"/>
-                      </p:stCondLst>
-                      <p:childTnLst>
-                        <p:par>
-                          <p:cTn id="8" fill="hold" nodeType="withGroup">
-                            <p:stCondLst>
-                              <p:cond delay="0"/>
-                            </p:stCondLst>
-                            <p:childTnLst>
-                              <p:par>
-                                <p:cTn id="9" presetID="1" presetClass="entr" presetSubtype="0" fill="hold" grpId="0" nodeType="clickEffect">
-                                  <p:stCondLst>
-                                    <p:cond delay="0"/>
-                                  </p:stCondLst>
-                                  <p:childTnLst>
-                                    <p:set>
-                                      <p:cBhvr>
-                                        <p:cTn id="10" dur="1" fill="hold">
-                                          <p:stCondLst>
-                                            <p:cond delay="0"/>
-                                          </p:stCondLst>
-                                        </p:cTn>
-                                        <p:tgtEl>
-                                          <p:spTgt spid="884739">
-                                            <p:txEl>
-                                              <p:pRg st="1" end="1"/>
-                                            </p:txEl>
-                                          </p:spTgt>
-                                        </p:tgtEl>
-                                        <p:attrNameLst>
-                                          <p:attrName>style.visibility</p:attrName>
-                                        </p:attrNameLst>
-                                      </p:cBhvr>
-                                      <p:to>
-                                        <p:strVal val="visible"/>
-                                      </p:to>
-                                    </p:set>
-                                  </p:childTnLst>
-                                </p:cTn>
-                              </p:par>
-                            </p:childTnLst>
-                          </p:cTn>
-                        </p:par>
-                      </p:childTnLst>
-                    </p:cTn>
-                  </p:par>
-                  <p:par>
-                    <p:cTn id="11" fill="hold" nodeType="clickPar">
-                      <p:stCondLst>
-                        <p:cond delay="indefinite"/>
-                      </p:stCondLst>
-                      <p:childTnLst>
-                        <p:par>
-                          <p:cTn id="12" fill="hold" nodeType="withGroup">
-                            <p:stCondLst>
-                              <p:cond delay="0"/>
-                            </p:stCondLst>
-                            <p:childTnLst>
-                              <p:par>
-                                <p:cTn id="13" presetID="1" presetClass="entr" presetSubtype="0" fill="hold" grpId="0" nodeType="clickEffect">
-                                  <p:stCondLst>
-                                    <p:cond delay="0"/>
-                                  </p:stCondLst>
-                                  <p:childTnLst>
-                                    <p:set>
-                                      <p:cBhvr>
-                                        <p:cTn id="14" dur="1" fill="hold">
-                                          <p:stCondLst>
-                                            <p:cond delay="0"/>
-                                          </p:stCondLst>
-                                        </p:cTn>
-                                        <p:tgtEl>
-                                          <p:spTgt spid="884739">
-                                            <p:txEl>
-                                              <p:pRg st="2" end="2"/>
-                                            </p:txEl>
-                                          </p:spTgt>
-                                        </p:tgtEl>
-                                        <p:attrNameLst>
-                                          <p:attrName>style.visibility</p:attrName>
-                                        </p:attrNameLst>
-                                      </p:cBhvr>
-                                      <p:to>
-                                        <p:strVal val="visible"/>
-                                      </p:to>
-                                    </p:set>
-                                  </p:childTnLst>
-                                </p:cTn>
-                              </p:par>
-                            </p:childTnLst>
-                          </p:cTn>
-                        </p:par>
-                      </p:childTnLst>
-                    </p:cTn>
-                  </p:par>
-                  <p:par>
-                    <p:cTn id="15" fill="hold" nodeType="clickPar">
-                      <p:stCondLst>
-                        <p:cond delay="indefinite"/>
-                      </p:stCondLst>
-                      <p:childTnLst>
-                        <p:par>
-                          <p:cTn id="16" fill="hold" nodeType="withGroup">
-                            <p:stCondLst>
-                              <p:cond delay="0"/>
-                            </p:stCondLst>
-                            <p:childTnLst>
-                              <p:par>
-                                <p:cTn id="17" presetID="1" presetClass="entr" presetSubtype="0" fill="hold" grpId="0" nodeType="clickEffect">
-                                  <p:stCondLst>
-                                    <p:cond delay="0"/>
-                                  </p:stCondLst>
-                                  <p:childTnLst>
-                                    <p:set>
-                                      <p:cBhvr>
-                                        <p:cTn id="18" dur="1" fill="hold">
-                                          <p:stCondLst>
-                                            <p:cond delay="0"/>
-                                          </p:stCondLst>
-                                        </p:cTn>
-                                        <p:tgtEl>
-                                          <p:spTgt spid="884739">
-                                            <p:txEl>
-                                              <p:pRg st="3" end="3"/>
-                                            </p:txEl>
-                                          </p:spTgt>
-                                        </p:tgtEl>
-                                        <p:attrNameLst>
-                                          <p:attrName>style.visibility</p:attrName>
-                                        </p:attrNameLst>
-                                      </p:cBhvr>
-                                      <p:to>
-                                        <p:strVal val="visible"/>
-                                      </p:to>
-                                    </p:set>
-                                  </p:childTnLst>
-                                </p:cTn>
-                              </p:par>
-                            </p:childTnLst>
-                          </p:cTn>
-                        </p:par>
-                      </p:childTnLst>
-                    </p:cTn>
-                  </p:par>
-                  <p:par>
-                    <p:cTn id="19" fill="hold" nodeType="clickPar">
-                      <p:stCondLst>
-                        <p:cond delay="indefinite"/>
-                      </p:stCondLst>
-                      <p:childTnLst>
-                        <p:par>
-                          <p:cTn id="20" fill="hold" nodeType="withGroup">
-                            <p:stCondLst>
-                              <p:cond delay="0"/>
-                            </p:stCondLst>
-                            <p:childTnLst>
-                              <p:par>
-                                <p:cTn id="21" presetID="1" presetClass="entr" presetSubtype="0" fill="hold" grpId="0" nodeType="clickEffect">
-                                  <p:stCondLst>
-                                    <p:cond delay="0"/>
-                                  </p:stCondLst>
-                                  <p:childTnLst>
-                                    <p:set>
-                                      <p:cBhvr>
-                                        <p:cTn id="22" dur="1" fill="hold">
-                                          <p:stCondLst>
-                                            <p:cond delay="0"/>
-                                          </p:stCondLst>
-                                        </p:cTn>
-                                        <p:tgtEl>
-                                          <p:spTgt spid="884739">
-                                            <p:txEl>
-                                              <p:pRg st="4" end="4"/>
-                                            </p:txEl>
-                                          </p:spTgt>
-                                        </p:tgtEl>
-                                        <p:attrNameLst>
-                                          <p:attrName>style.visibility</p:attrName>
-                                        </p:attrNameLst>
-                                      </p:cBhvr>
-                                      <p:to>
-                                        <p:strVal val="visible"/>
-                                      </p:to>
-                                    </p:set>
-                                  </p:childTnLst>
-                                </p:cTn>
-                              </p:par>
-                            </p:childTnLst>
-                          </p:cTn>
-                        </p:par>
-                      </p:childTnLst>
-                    </p:cTn>
-                  </p:par>
-                  <p:par>
-                    <p:cTn id="23" fill="hold" nodeType="clickPar">
-                      <p:stCondLst>
-                        <p:cond delay="indefinite"/>
-                      </p:stCondLst>
-                      <p:childTnLst>
-                        <p:par>
-                          <p:cTn id="24" fill="hold" nodeType="withGroup">
-                            <p:stCondLst>
-                              <p:cond delay="0"/>
-                            </p:stCondLst>
-                            <p:childTnLst>
-                              <p:par>
-                                <p:cTn id="25" presetID="1" presetClass="entr" presetSubtype="0" fill="hold" grpId="0" nodeType="clickEffect">
-                                  <p:stCondLst>
-                                    <p:cond delay="0"/>
-                                  </p:stCondLst>
-                                  <p:childTnLst>
-                                    <p:set>
-                                      <p:cBhvr>
-                                        <p:cTn id="26" dur="1" fill="hold">
-                                          <p:stCondLst>
-                                            <p:cond delay="0"/>
-                                          </p:stCondLst>
-                                        </p:cTn>
-                                        <p:tgtEl>
-                                          <p:spTgt spid="884739">
-                                            <p:txEl>
-                                              <p:pRg st="5" end="5"/>
-                                            </p:txEl>
-                                          </p:spTgt>
-                                        </p:tgtEl>
-                                        <p:attrNameLst>
-                                          <p:attrName>style.visibility</p:attrName>
-                                        </p:attrNameLst>
-                                      </p:cBhvr>
-                                      <p:to>
-                                        <p:strVal val="visible"/>
-                                      </p:to>
-                                    </p:set>
-                                  </p:childTnLst>
-                                </p:cTn>
-                              </p:par>
-                            </p:childTnLst>
-                          </p:cTn>
-                        </p:par>
-                      </p:childTnLst>
-                    </p:cTn>
-                  </p:par>
-                  <p:par>
-                    <p:cTn id="27" fill="hold" nodeType="clickPar">
-                      <p:stCondLst>
-                        <p:cond delay="indefinite"/>
-                      </p:stCondLst>
-                      <p:childTnLst>
-                        <p:par>
-                          <p:cTn id="28" fill="hold" nodeType="withGroup">
-                            <p:stCondLst>
-                              <p:cond delay="0"/>
-                            </p:stCondLst>
-                            <p:childTnLst>
-                              <p:par>
-                                <p:cTn id="29" presetID="1" presetClass="entr" presetSubtype="0" fill="hold" grpId="0" nodeType="clickEffect">
-                                  <p:stCondLst>
-                                    <p:cond delay="0"/>
-                                  </p:stCondLst>
-                                  <p:childTnLst>
-                                    <p:set>
-                                      <p:cBhvr>
-                                        <p:cTn id="30" dur="1" fill="hold">
-                                          <p:stCondLst>
-                                            <p:cond delay="0"/>
-                                          </p:stCondLst>
-                                        </p:cTn>
-                                        <p:tgtEl>
-                                          <p:spTgt spid="884739">
-                                            <p:txEl>
-                                              <p:pRg st="6" end="6"/>
-                                            </p:txEl>
-                                          </p:spTgt>
-                                        </p:tgtEl>
-                                        <p:attrNameLst>
-                                          <p:attrName>style.visibility</p:attrName>
-                                        </p:attrNameLst>
-                                      </p:cBhvr>
-                                      <p:to>
-                                        <p:strVal val="visible"/>
-                                      </p:to>
-                                    </p:set>
-                                  </p:childTnLst>
-                                </p:cTn>
-                              </p:par>
-                            </p:childTnLst>
-                          </p:cTn>
-                        </p:par>
-                      </p:childTnLst>
-                    </p:cTn>
-                  </p:par>
-                  <p:par>
-                    <p:cTn id="31" fill="hold" nodeType="clickPar">
-                      <p:stCondLst>
-                        <p:cond delay="indefinite"/>
-                      </p:stCondLst>
-                      <p:childTnLst>
-                        <p:par>
-                          <p:cTn id="32" fill="hold" nodeType="withGroup">
-                            <p:stCondLst>
-                              <p:cond delay="0"/>
-                            </p:stCondLst>
-                            <p:childTnLst>
-                              <p:par>
-                                <p:cTn id="33" presetID="1" presetClass="entr" presetSubtype="0" fill="hold" grpId="0" nodeType="clickEffect">
-                                  <p:stCondLst>
-                                    <p:cond delay="0"/>
-                                  </p:stCondLst>
-                                  <p:childTnLst>
-                                    <p:set>
-                                      <p:cBhvr>
-                                        <p:cTn id="34" dur="1" fill="hold">
-                                          <p:stCondLst>
-                                            <p:cond delay="0"/>
-                                          </p:stCondLst>
-                                        </p:cTn>
-                                        <p:tgtEl>
                                           <p:spTgt spid="4"/>
                                         </p:tgtEl>
                                         <p:attrNameLst>
@@ -47988,7 +47635,6 @@
       </p:par>
     </p:tnLst>
     <p:bldLst>
-      <p:bldP spid="884739" grpId="0" build="p"/>
       <p:bldP spid="4" grpId="0"/>
     </p:bldLst>
   </p:timing>
@@ -52148,7 +51794,7 @@
           </a:p>
           <a:p>
             <a:r>
-              <a:rPr lang="en-US" sz="1800" b="0" dirty="0">
+              <a:rPr lang="en-US" sz="1800" b="0" dirty="0" smtClean="0">
                 <a:solidFill>
                   <a:srgbClr val="000000"/>
                 </a:solidFill>
@@ -52158,7 +51804,7 @@
               <a:t>What</a:t>
             </a:r>
             <a:r>
-              <a:rPr lang="ja-JP" altLang="en-US" sz="1800" b="0" dirty="0">
+              <a:rPr lang="en-US" altLang="ja-JP" sz="1800" b="0" dirty="0" smtClean="0">
                 <a:solidFill>
                   <a:srgbClr val="000000"/>
                 </a:solidFill>
@@ -52168,14 +51814,24 @@
               <a:t>’</a:t>
             </a:r>
             <a:r>
-              <a:rPr lang="en-US" sz="1800" b="0" dirty="0">
+              <a:rPr lang="en-US" sz="1800" b="0" dirty="0" smtClean="0">
                 <a:solidFill>
                   <a:srgbClr val="000000"/>
                 </a:solidFill>
                 <a:latin typeface="Gill Sans"/>
                 <a:cs typeface="Gill Sans"/>
               </a:rPr>
-              <a:t>s the ISBN number of </a:t>
+              <a:t>s </a:t>
+            </a:r>
+            <a:r>
+              <a:rPr lang="en-US" sz="1800" b="0" dirty="0">
+                <a:solidFill>
+                  <a:srgbClr val="000000"/>
+                </a:solidFill>
+                <a:latin typeface="Gill Sans"/>
+                <a:cs typeface="Gill Sans"/>
+              </a:rPr>
+              <a:t>the ISBN number of </a:t>
             </a:r>
             <a:r>
               <a:rPr lang="en-US" altLang="ja-JP" sz="1800" b="0" dirty="0" smtClean="0">

</xml_diff>